<commit_message>
Added Part 3 to presentation
</commit_message>
<xml_diff>
--- a/Presentation.pptx
+++ b/Presentation.pptx
@@ -108,7 +108,16 @@
       </a:defRPr>
     </a:lvl9pPr>
   </p:defaultTextStyle>
+  <p:extLst>
+    <p:ext uri="{EFAFB233-063F-42B5-8137-9DF3F51BA10A}">
+      <p15:sldGuideLst xmlns:p15="http://schemas.microsoft.com/office/powerpoint/2012/main"/>
+    </p:ext>
+  </p:extLst>
 </p:presentation>
+</file>
+
+<file path=ppt/revisionInfo.xml><?xml version="1.0" encoding="utf-8"?>
+<p1510:revInfo xmlns:a="http://schemas.openxmlformats.org/drawingml/2006/main" xmlns:r="http://schemas.openxmlformats.org/officeDocument/2006/relationships" xmlns:p1510="http://schemas.microsoft.com/office/powerpoint/2015/10/main"/>
 </file>
 
 <file path=ppt/slideLayouts/slideLayout1.xml><?xml version="1.0" encoding="utf-8"?>
@@ -8046,12 +8055,78 @@
             <p:ph idx="1"/>
           </p:nvPr>
         </p:nvSpPr>
-        <p:spPr/>
-        <p:txBody>
-          <a:bodyPr/>
+        <p:spPr>
+          <a:xfrm>
+            <a:off x="2589212" y="2133600"/>
+            <a:ext cx="8915400" cy="3978442"/>
+          </a:xfrm>
+        </p:spPr>
+        <p:txBody>
+          <a:bodyPr>
+            <a:normAutofit/>
+          </a:bodyPr>
           <a:lstStyle/>
           <a:p>
-            <a:endParaRPr lang="en-CA"/>
+            <a:r>
+              <a:rPr lang="en-CA" dirty="0"/>
+              <a:t>How much overhead has file logging added to the performance of your program?</a:t>
+            </a:r>
+          </a:p>
+          <a:p>
+            <a:pPr lvl="1"/>
+            <a:r>
+              <a:rPr lang="en-CA" dirty="0"/>
+              <a:t>File logging added a lot of delay because of the way we implemented it</a:t>
+            </a:r>
+          </a:p>
+          <a:p>
+            <a:pPr lvl="2"/>
+            <a:r>
+              <a:rPr lang="en-CA" dirty="0"/>
+              <a:t>Would reopen file for each write.</a:t>
+            </a:r>
+          </a:p>
+          <a:p>
+            <a:pPr lvl="1"/>
+            <a:r>
+              <a:rPr lang="en-CA" dirty="0"/>
+              <a:t>Runtime was SERVERLY slower than it was without logging.</a:t>
+            </a:r>
+          </a:p>
+          <a:p>
+            <a:r>
+              <a:rPr lang="en-CA" dirty="0"/>
+              <a:t>How have you relieved the I/O delay to improve performance?</a:t>
+            </a:r>
+          </a:p>
+          <a:p>
+            <a:pPr lvl="1"/>
+            <a:r>
+              <a:rPr lang="en-CA" dirty="0"/>
+              <a:t>Had to make it faster, because it would grow linearly with the number of terms being calculated.</a:t>
+            </a:r>
+          </a:p>
+          <a:p>
+            <a:pPr lvl="1"/>
+            <a:r>
+              <a:rPr lang="en-CA" dirty="0"/>
+              <a:t>Used a </a:t>
+            </a:r>
+            <a:r>
+              <a:rPr lang="en-CA" dirty="0" err="1"/>
+              <a:t>BufferedWriter</a:t>
+            </a:r>
+            <a:r>
+              <a:rPr lang="en-CA" dirty="0"/>
+              <a:t> to keep changes in memory, only writing when there was a lot to write in the buffer</a:t>
+            </a:r>
+          </a:p>
+          <a:p>
+            <a:pPr lvl="2"/>
+            <a:r>
+              <a:rPr lang="en-CA" dirty="0"/>
+              <a:t>This reduced the number of writes required, meaning there was almost no overhead anymore.</a:t>
+            </a:r>
           </a:p>
         </p:txBody>
       </p:sp>

</xml_diff>